<commit_message>
docs: atualizando link para acesso a aplicação
</commit_message>
<xml_diff>
--- a/presentation/ConectaONG-Conectando-Propositos-Transformando-Vidas.pptx
+++ b/presentation/ConectaONG-Conectando-Propositos-Transformando-Vidas.pptx
@@ -9162,7 +9162,7 @@
         <p:spPr>
           <a:xfrm>
             <a:off x="689372" y="6608445"/>
-            <a:ext cx="13251656" cy="315039"/>
+            <a:ext cx="13251656" cy="1417318"/>
           </a:xfrm>
           <a:prstGeom prst="rect">
             <a:avLst/>
@@ -9189,7 +9189,66 @@
                 <a:ea typeface="Fira Sans" pitchFamily="34" charset="-122"/>
                 <a:cs typeface="Fira Sans" pitchFamily="34" charset="-120"/>
               </a:rPr>
-              <a:t>Agradecemos sua atenção e convidamos você a fazer parte dessa transformação. Juntos, podemos fortalecer o voluntariado.</a:t>
+              <a:t>Agradecemos sua atenção e convidamos você a fazer parte dessa transformação. Juntos, podemos fortalecer o </a:t>
+            </a:r>
+            <a:r>
+              <a:rPr lang="en-US" sz="1550" dirty="0" err="1">
+                <a:solidFill>
+                  <a:srgbClr val="E0D6DE"/>
+                </a:solidFill>
+                <a:latin typeface="Fira Sans" pitchFamily="34" charset="0"/>
+                <a:ea typeface="Fira Sans" pitchFamily="34" charset="-122"/>
+                <a:cs typeface="Fira Sans" pitchFamily="34" charset="-120"/>
+              </a:rPr>
+              <a:t>voluntariado</a:t>
+            </a:r>
+            <a:r>
+              <a:rPr lang="en-US" sz="1550" dirty="0">
+                <a:solidFill>
+                  <a:srgbClr val="E0D6DE"/>
+                </a:solidFill>
+                <a:latin typeface="Fira Sans" pitchFamily="34" charset="0"/>
+                <a:ea typeface="Fira Sans" pitchFamily="34" charset="-122"/>
+                <a:cs typeface="Fira Sans" pitchFamily="34" charset="-120"/>
+              </a:rPr>
+              <a:t>.</a:t>
+            </a:r>
+          </a:p>
+          <a:p>
+            <a:pPr>
+              <a:lnSpc>
+                <a:spcPts val="2450"/>
+              </a:lnSpc>
+            </a:pPr>
+            <a:r>
+              <a:rPr lang="en-US" sz="1550" dirty="0">
+                <a:solidFill>
+                  <a:srgbClr val="E0D6DE"/>
+                </a:solidFill>
+                <a:latin typeface="Fira Sans" pitchFamily="34" charset="0"/>
+              </a:rPr>
+              <a:t>Link para o </a:t>
+            </a:r>
+            <a:r>
+              <a:rPr lang="en-US" sz="1550">
+                <a:solidFill>
+                  <a:srgbClr val="E0D6DE"/>
+                </a:solidFill>
+                <a:latin typeface="Fira Sans" pitchFamily="34" charset="0"/>
+              </a:rPr>
+              <a:t>conectaOng: </a:t>
+            </a:r>
+            <a:r>
+              <a:rPr lang="pt-BR" sz="1600" dirty="0">
+                <a:hlinkClick r:id="rId3"/>
+              </a:rPr>
+              <a:t>Home Page - </a:t>
+            </a:r>
+            <a:r>
+              <a:rPr lang="pt-BR" sz="1600" dirty="0" err="1">
+                <a:hlinkClick r:id="rId3"/>
+              </a:rPr>
+              <a:t>conectaOng</a:t>
             </a:r>
             <a:endParaRPr lang="en-US" sz="1550" dirty="0"/>
           </a:p>
@@ -9217,7 +9276,7 @@
         </p:grpSpPr>
         <mc:AlternateContent xmlns:mc="http://schemas.openxmlformats.org/markup-compatibility/2006" xmlns:p14="http://schemas.microsoft.com/office/powerpoint/2010/main">
           <mc:Choice Requires="p14">
-            <p:contentPart p14:bwMode="auto" r:id="rId3">
+            <p:contentPart p14:bwMode="auto" r:id="rId4">
               <p14:nvContentPartPr>
                 <p14:cNvPr id="25" name="Tinta 24">
                   <a:extLst>
@@ -9249,7 +9308,7 @@
                 <p:nvPr/>
               </p:nvPicPr>
               <p:blipFill>
-                <a:blip r:embed="rId4"/>
+                <a:blip r:embed="rId5"/>
                 <a:stretch>
                   <a:fillRect/>
                 </a:stretch>
@@ -9268,7 +9327,7 @@
         </mc:AlternateContent>
         <mc:AlternateContent xmlns:mc="http://schemas.openxmlformats.org/markup-compatibility/2006" xmlns:p14="http://schemas.microsoft.com/office/powerpoint/2010/main">
           <mc:Choice Requires="p14">
-            <p:contentPart p14:bwMode="auto" r:id="rId5">
+            <p:contentPart p14:bwMode="auto" r:id="rId6">
               <p14:nvContentPartPr>
                 <p14:cNvPr id="26" name="Tinta 25">
                   <a:extLst>
@@ -9300,7 +9359,7 @@
                 <p:nvPr/>
               </p:nvPicPr>
               <p:blipFill>
-                <a:blip r:embed="rId6"/>
+                <a:blip r:embed="rId7"/>
                 <a:stretch>
                   <a:fillRect/>
                 </a:stretch>
@@ -9319,7 +9378,7 @@
         </mc:AlternateContent>
         <mc:AlternateContent xmlns:mc="http://schemas.openxmlformats.org/markup-compatibility/2006" xmlns:p14="http://schemas.microsoft.com/office/powerpoint/2010/main">
           <mc:Choice Requires="p14">
-            <p:contentPart p14:bwMode="auto" r:id="rId7">
+            <p:contentPart p14:bwMode="auto" r:id="rId8">
               <p14:nvContentPartPr>
                 <p14:cNvPr id="27" name="Tinta 26">
                   <a:extLst>
@@ -9351,7 +9410,7 @@
                 <p:nvPr/>
               </p:nvPicPr>
               <p:blipFill>
-                <a:blip r:embed="rId8"/>
+                <a:blip r:embed="rId9"/>
                 <a:stretch>
                   <a:fillRect/>
                 </a:stretch>
@@ -9391,7 +9450,7 @@
         </p:grpSpPr>
         <mc:AlternateContent xmlns:mc="http://schemas.openxmlformats.org/markup-compatibility/2006" xmlns:p14="http://schemas.microsoft.com/office/powerpoint/2010/main">
           <mc:Choice Requires="p14">
-            <p:contentPart p14:bwMode="auto" r:id="rId9">
+            <p:contentPart p14:bwMode="auto" r:id="rId10">
               <p14:nvContentPartPr>
                 <p14:cNvPr id="23" name="Tinta 22">
                   <a:extLst>
@@ -9423,7 +9482,7 @@
                 <p:nvPr/>
               </p:nvPicPr>
               <p:blipFill>
-                <a:blip r:embed="rId10"/>
+                <a:blip r:embed="rId11"/>
                 <a:stretch>
                   <a:fillRect/>
                 </a:stretch>
@@ -9442,7 +9501,7 @@
         </mc:AlternateContent>
         <mc:AlternateContent xmlns:mc="http://schemas.openxmlformats.org/markup-compatibility/2006" xmlns:p14="http://schemas.microsoft.com/office/powerpoint/2010/main">
           <mc:Choice Requires="p14">
-            <p:contentPart p14:bwMode="auto" r:id="rId11">
+            <p:contentPart p14:bwMode="auto" r:id="rId12">
               <p14:nvContentPartPr>
                 <p14:cNvPr id="24" name="Tinta 23">
                   <a:extLst>
@@ -9474,7 +9533,7 @@
                 <p:nvPr/>
               </p:nvPicPr>
               <p:blipFill>
-                <a:blip r:embed="rId12"/>
+                <a:blip r:embed="rId13"/>
                 <a:stretch>
                   <a:fillRect/>
                 </a:stretch>
@@ -9493,7 +9552,7 @@
         </mc:AlternateContent>
         <mc:AlternateContent xmlns:mc="http://schemas.openxmlformats.org/markup-compatibility/2006" xmlns:p14="http://schemas.microsoft.com/office/powerpoint/2010/main">
           <mc:Choice Requires="p14">
-            <p:contentPart p14:bwMode="auto" r:id="rId13">
+            <p:contentPart p14:bwMode="auto" r:id="rId14">
               <p14:nvContentPartPr>
                 <p14:cNvPr id="30" name="Tinta 29">
                   <a:extLst>
@@ -9525,7 +9584,7 @@
                 <p:nvPr/>
               </p:nvPicPr>
               <p:blipFill>
-                <a:blip r:embed="rId14"/>
+                <a:blip r:embed="rId15"/>
                 <a:stretch>
                   <a:fillRect/>
                 </a:stretch>

</xml_diff>